<commit_message>
upgraded figure visualising test data
</commit_message>
<xml_diff>
--- a/docs/tests/fig1.pptx
+++ b/docs/tests/fig1.pptx
@@ -7,6 +7,7 @@
   <p:sldIdLst>
     <p:sldId id="256" r:id="rId2"/>
     <p:sldId id="257" r:id="rId3"/>
+    <p:sldId id="258" r:id="rId4"/>
   </p:sldIdLst>
   <p:sldSz cx="9144000" cy="6858000" type="screen4x3"/>
   <p:notesSz cx="6858000" cy="9144000"/>
@@ -290,7 +291,7 @@
             <a:fld id="{CDF13FAC-F2F0-474B-98DE-1D9E05F27755}" type="datetimeFigureOut">
               <a:rPr lang="en-US" smtClean="0"/>
               <a:pPr/>
-              <a:t>4/21/10</a:t>
+              <a:t>5/20/11</a:t>
             </a:fld>
             <a:endParaRPr lang="en-US"/>
           </a:p>
@@ -457,7 +458,7 @@
             <a:fld id="{CDF13FAC-F2F0-474B-98DE-1D9E05F27755}" type="datetimeFigureOut">
               <a:rPr lang="en-US" smtClean="0"/>
               <a:pPr/>
-              <a:t>4/21/10</a:t>
+              <a:t>5/20/11</a:t>
             </a:fld>
             <a:endParaRPr lang="en-US"/>
           </a:p>
@@ -634,7 +635,7 @@
             <a:fld id="{CDF13FAC-F2F0-474B-98DE-1D9E05F27755}" type="datetimeFigureOut">
               <a:rPr lang="en-US" smtClean="0"/>
               <a:pPr/>
-              <a:t>4/21/10</a:t>
+              <a:t>5/20/11</a:t>
             </a:fld>
             <a:endParaRPr lang="en-US"/>
           </a:p>
@@ -801,7 +802,7 @@
             <a:fld id="{CDF13FAC-F2F0-474B-98DE-1D9E05F27755}" type="datetimeFigureOut">
               <a:rPr lang="en-US" smtClean="0"/>
               <a:pPr/>
-              <a:t>4/21/10</a:t>
+              <a:t>5/20/11</a:t>
             </a:fld>
             <a:endParaRPr lang="en-US"/>
           </a:p>
@@ -1044,7 +1045,7 @@
             <a:fld id="{CDF13FAC-F2F0-474B-98DE-1D9E05F27755}" type="datetimeFigureOut">
               <a:rPr lang="en-US" smtClean="0"/>
               <a:pPr/>
-              <a:t>4/21/10</a:t>
+              <a:t>5/20/11</a:t>
             </a:fld>
             <a:endParaRPr lang="en-US"/>
           </a:p>
@@ -1329,7 +1330,7 @@
             <a:fld id="{CDF13FAC-F2F0-474B-98DE-1D9E05F27755}" type="datetimeFigureOut">
               <a:rPr lang="en-US" smtClean="0"/>
               <a:pPr/>
-              <a:t>4/21/10</a:t>
+              <a:t>5/20/11</a:t>
             </a:fld>
             <a:endParaRPr lang="en-US"/>
           </a:p>
@@ -1748,7 +1749,7 @@
             <a:fld id="{CDF13FAC-F2F0-474B-98DE-1D9E05F27755}" type="datetimeFigureOut">
               <a:rPr lang="en-US" smtClean="0"/>
               <a:pPr/>
-              <a:t>4/21/10</a:t>
+              <a:t>5/20/11</a:t>
             </a:fld>
             <a:endParaRPr lang="en-US"/>
           </a:p>
@@ -1863,7 +1864,7 @@
             <a:fld id="{CDF13FAC-F2F0-474B-98DE-1D9E05F27755}" type="datetimeFigureOut">
               <a:rPr lang="en-US" smtClean="0"/>
               <a:pPr/>
-              <a:t>4/21/10</a:t>
+              <a:t>5/20/11</a:t>
             </a:fld>
             <a:endParaRPr lang="en-US"/>
           </a:p>
@@ -1955,7 +1956,7 @@
             <a:fld id="{CDF13FAC-F2F0-474B-98DE-1D9E05F27755}" type="datetimeFigureOut">
               <a:rPr lang="en-US" smtClean="0"/>
               <a:pPr/>
-              <a:t>4/21/10</a:t>
+              <a:t>5/20/11</a:t>
             </a:fld>
             <a:endParaRPr lang="en-US"/>
           </a:p>
@@ -2229,7 +2230,7 @@
             <a:fld id="{CDF13FAC-F2F0-474B-98DE-1D9E05F27755}" type="datetimeFigureOut">
               <a:rPr lang="en-US" smtClean="0"/>
               <a:pPr/>
-              <a:t>4/21/10</a:t>
+              <a:t>5/20/11</a:t>
             </a:fld>
             <a:endParaRPr lang="en-US"/>
           </a:p>
@@ -2479,7 +2480,7 @@
             <a:fld id="{CDF13FAC-F2F0-474B-98DE-1D9E05F27755}" type="datetimeFigureOut">
               <a:rPr lang="en-US" smtClean="0"/>
               <a:pPr/>
-              <a:t>4/21/10</a:t>
+              <a:t>5/20/11</a:t>
             </a:fld>
             <a:endParaRPr lang="en-US"/>
           </a:p>
@@ -2689,7 +2690,7 @@
             <a:fld id="{CDF13FAC-F2F0-474B-98DE-1D9E05F27755}" type="datetimeFigureOut">
               <a:rPr lang="en-US" smtClean="0"/>
               <a:pPr/>
-              <a:t>4/21/10</a:t>
+              <a:t>5/20/11</a:t>
             </a:fld>
             <a:endParaRPr lang="en-US"/>
           </a:p>
@@ -5302,6 +5303,1154 @@
               <a:t>e9</a:t>
             </a:r>
             <a:endParaRPr lang="en-US" sz="1200" dirty="0"/>
+          </a:p>
+        </p:txBody>
+      </p:sp>
+    </p:spTree>
+  </p:cSld>
+  <p:clrMapOvr>
+    <a:masterClrMapping/>
+  </p:clrMapOvr>
+</p:sld>
+</file>
+
+<file path=ppt/slides/slide3.xml><?xml version="1.0" encoding="utf-8"?>
+<p:sld xmlns:a="http://schemas.openxmlformats.org/drawingml/2006/main" xmlns:r="http://schemas.openxmlformats.org/officeDocument/2006/relationships" xmlns:mc="http://schemas.openxmlformats.org/markup-compatibility/2006" xmlns:mv="urn:schemas-microsoft-com:mac:vml" xmlns:p="http://schemas.openxmlformats.org/presentationml/2006/main" mc:Ignorable="mv" mc:PreserveAttributes="mv:*">
+  <p:cSld>
+    <p:spTree>
+      <p:nvGrpSpPr>
+        <p:cNvPr id="1" name=""/>
+        <p:cNvGrpSpPr/>
+        <p:nvPr/>
+      </p:nvGrpSpPr>
+      <p:grpSpPr>
+        <a:xfrm>
+          <a:off x="0" y="0"/>
+          <a:ext cx="0" cy="0"/>
+          <a:chOff x="0" y="0"/>
+          <a:chExt cx="0" cy="0"/>
+        </a:xfrm>
+      </p:grpSpPr>
+      <p:grpSp>
+        <p:nvGrpSpPr>
+          <p:cNvPr id="44" name="Group 43"/>
+          <p:cNvGrpSpPr/>
+          <p:nvPr/>
+        </p:nvGrpSpPr>
+        <p:grpSpPr>
+          <a:xfrm>
+            <a:off x="1447800" y="1328663"/>
+            <a:ext cx="4419600" cy="1578605"/>
+            <a:chOff x="1447800" y="1328663"/>
+            <a:chExt cx="4419600" cy="1578605"/>
+          </a:xfrm>
+        </p:grpSpPr>
+        <p:sp>
+          <p:nvSpPr>
+            <p:cNvPr id="5" name="Oval 4"/>
+            <p:cNvSpPr/>
+            <p:nvPr/>
+          </p:nvSpPr>
+          <p:spPr>
+            <a:xfrm>
+              <a:off x="1447800" y="1916668"/>
+              <a:ext cx="457200" cy="457200"/>
+            </a:xfrm>
+            <a:prstGeom prst="ellipse">
+              <a:avLst/>
+            </a:prstGeom>
+          </p:spPr>
+          <p:style>
+            <a:lnRef idx="1">
+              <a:schemeClr val="accent1"/>
+            </a:lnRef>
+            <a:fillRef idx="3">
+              <a:schemeClr val="accent1"/>
+            </a:fillRef>
+            <a:effectRef idx="2">
+              <a:schemeClr val="accent1"/>
+            </a:effectRef>
+            <a:fontRef idx="minor">
+              <a:schemeClr val="lt1"/>
+            </a:fontRef>
+          </p:style>
+          <p:txBody>
+            <a:bodyPr rtlCol="0" anchor="ctr"/>
+            <a:lstStyle/>
+            <a:p>
+              <a:pPr algn="ctr"/>
+              <a:r>
+                <a:rPr lang="en-US" sz="1100" dirty="0" smtClean="0"/>
+                <a:t>v</a:t>
+              </a:r>
+              <a:r>
+                <a:rPr lang="en-US" sz="1100" dirty="0" smtClean="0"/>
+                <a:t>1</a:t>
+              </a:r>
+              <a:endParaRPr lang="en-US" sz="1100" dirty="0"/>
+            </a:p>
+          </p:txBody>
+        </p:sp>
+        <p:sp>
+          <p:nvSpPr>
+            <p:cNvPr id="6" name="Oval 5"/>
+            <p:cNvSpPr/>
+            <p:nvPr/>
+          </p:nvSpPr>
+          <p:spPr>
+            <a:xfrm>
+              <a:off x="4038600" y="1459468"/>
+              <a:ext cx="457200" cy="457200"/>
+            </a:xfrm>
+            <a:prstGeom prst="ellipse">
+              <a:avLst/>
+            </a:prstGeom>
+          </p:spPr>
+          <p:style>
+            <a:lnRef idx="1">
+              <a:schemeClr val="accent1"/>
+            </a:lnRef>
+            <a:fillRef idx="3">
+              <a:schemeClr val="accent1"/>
+            </a:fillRef>
+            <a:effectRef idx="2">
+              <a:schemeClr val="accent1"/>
+            </a:effectRef>
+            <a:fontRef idx="minor">
+              <a:schemeClr val="lt1"/>
+            </a:fontRef>
+          </p:style>
+          <p:txBody>
+            <a:bodyPr rtlCol="0" anchor="ctr"/>
+            <a:lstStyle/>
+            <a:p>
+              <a:pPr algn="ctr"/>
+              <a:r>
+                <a:rPr lang="en-US" sz="1100" dirty="0" smtClean="0"/>
+                <a:t>v3</a:t>
+              </a:r>
+              <a:endParaRPr lang="en-US" sz="1100" dirty="0"/>
+            </a:p>
+          </p:txBody>
+        </p:sp>
+        <p:sp>
+          <p:nvSpPr>
+            <p:cNvPr id="7" name="Oval 6"/>
+            <p:cNvSpPr/>
+            <p:nvPr/>
+          </p:nvSpPr>
+          <p:spPr>
+            <a:xfrm>
+              <a:off x="2819400" y="1459468"/>
+              <a:ext cx="457200" cy="457200"/>
+            </a:xfrm>
+            <a:prstGeom prst="ellipse">
+              <a:avLst/>
+            </a:prstGeom>
+          </p:spPr>
+          <p:style>
+            <a:lnRef idx="1">
+              <a:schemeClr val="accent1"/>
+            </a:lnRef>
+            <a:fillRef idx="3">
+              <a:schemeClr val="accent1"/>
+            </a:fillRef>
+            <a:effectRef idx="2">
+              <a:schemeClr val="accent1"/>
+            </a:effectRef>
+            <a:fontRef idx="minor">
+              <a:schemeClr val="lt1"/>
+            </a:fontRef>
+          </p:style>
+          <p:txBody>
+            <a:bodyPr rtlCol="0" anchor="ctr"/>
+            <a:lstStyle/>
+            <a:p>
+              <a:pPr algn="ctr"/>
+              <a:r>
+                <a:rPr lang="en-US" sz="1100" dirty="0" smtClean="0"/>
+                <a:t>v2</a:t>
+              </a:r>
+              <a:endParaRPr lang="en-US" sz="1100" dirty="0"/>
+            </a:p>
+          </p:txBody>
+        </p:sp>
+        <p:sp>
+          <p:nvSpPr>
+            <p:cNvPr id="8" name="Oval 7"/>
+            <p:cNvSpPr/>
+            <p:nvPr/>
+          </p:nvSpPr>
+          <p:spPr>
+            <a:xfrm>
+              <a:off x="2819400" y="2450068"/>
+              <a:ext cx="457200" cy="457200"/>
+            </a:xfrm>
+            <a:prstGeom prst="ellipse">
+              <a:avLst/>
+            </a:prstGeom>
+          </p:spPr>
+          <p:style>
+            <a:lnRef idx="1">
+              <a:schemeClr val="accent1"/>
+            </a:lnRef>
+            <a:fillRef idx="3">
+              <a:schemeClr val="accent1"/>
+            </a:fillRef>
+            <a:effectRef idx="2">
+              <a:schemeClr val="accent1"/>
+            </a:effectRef>
+            <a:fontRef idx="minor">
+              <a:schemeClr val="lt1"/>
+            </a:fontRef>
+          </p:style>
+          <p:txBody>
+            <a:bodyPr rtlCol="0" anchor="ctr"/>
+            <a:lstStyle/>
+            <a:p>
+              <a:pPr algn="ctr"/>
+              <a:r>
+                <a:rPr lang="en-US" sz="1100" dirty="0" smtClean="0"/>
+                <a:t>v4</a:t>
+              </a:r>
+              <a:endParaRPr lang="en-US" sz="1100" dirty="0"/>
+            </a:p>
+          </p:txBody>
+        </p:sp>
+        <p:sp>
+          <p:nvSpPr>
+            <p:cNvPr id="9" name="Oval 8"/>
+            <p:cNvSpPr/>
+            <p:nvPr/>
+          </p:nvSpPr>
+          <p:spPr>
+            <a:xfrm>
+              <a:off x="4038600" y="2450068"/>
+              <a:ext cx="457200" cy="457200"/>
+            </a:xfrm>
+            <a:prstGeom prst="ellipse">
+              <a:avLst/>
+            </a:prstGeom>
+          </p:spPr>
+          <p:style>
+            <a:lnRef idx="1">
+              <a:schemeClr val="accent1"/>
+            </a:lnRef>
+            <a:fillRef idx="3">
+              <a:schemeClr val="accent1"/>
+            </a:fillRef>
+            <a:effectRef idx="2">
+              <a:schemeClr val="accent1"/>
+            </a:effectRef>
+            <a:fontRef idx="minor">
+              <a:schemeClr val="lt1"/>
+            </a:fontRef>
+          </p:style>
+          <p:txBody>
+            <a:bodyPr rtlCol="0" anchor="ctr"/>
+            <a:lstStyle/>
+            <a:p>
+              <a:pPr algn="ctr"/>
+              <a:r>
+                <a:rPr lang="en-US" sz="1100" dirty="0" smtClean="0"/>
+                <a:t>v5</a:t>
+              </a:r>
+              <a:endParaRPr lang="en-US" sz="1100" dirty="0"/>
+            </a:p>
+          </p:txBody>
+        </p:sp>
+        <p:sp>
+          <p:nvSpPr>
+            <p:cNvPr id="10" name="Oval 9"/>
+            <p:cNvSpPr/>
+            <p:nvPr/>
+          </p:nvSpPr>
+          <p:spPr>
+            <a:xfrm>
+              <a:off x="5410200" y="1916668"/>
+              <a:ext cx="457200" cy="457200"/>
+            </a:xfrm>
+            <a:prstGeom prst="ellipse">
+              <a:avLst/>
+            </a:prstGeom>
+          </p:spPr>
+          <p:style>
+            <a:lnRef idx="1">
+              <a:schemeClr val="accent1"/>
+            </a:lnRef>
+            <a:fillRef idx="3">
+              <a:schemeClr val="accent1"/>
+            </a:fillRef>
+            <a:effectRef idx="2">
+              <a:schemeClr val="accent1"/>
+            </a:effectRef>
+            <a:fontRef idx="minor">
+              <a:schemeClr val="lt1"/>
+            </a:fontRef>
+          </p:style>
+          <p:txBody>
+            <a:bodyPr rtlCol="0" anchor="ctr"/>
+            <a:lstStyle/>
+            <a:p>
+              <a:pPr algn="ctr"/>
+              <a:r>
+                <a:rPr lang="en-US" sz="1100" dirty="0" smtClean="0"/>
+                <a:t>v6</a:t>
+              </a:r>
+              <a:endParaRPr lang="en-US" sz="1100" dirty="0"/>
+            </a:p>
+          </p:txBody>
+        </p:sp>
+        <p:cxnSp>
+          <p:nvCxnSpPr>
+            <p:cNvPr id="12" name="Curved Connector 11"/>
+            <p:cNvCxnSpPr>
+              <a:stCxn id="7" idx="6"/>
+              <a:endCxn id="6" idx="2"/>
+            </p:cNvCxnSpPr>
+            <p:nvPr/>
+          </p:nvCxnSpPr>
+          <p:spPr>
+            <a:xfrm>
+              <a:off x="3276600" y="1688068"/>
+              <a:ext cx="762000" cy="1588"/>
+            </a:xfrm>
+            <a:prstGeom prst="curvedConnector3">
+              <a:avLst>
+                <a:gd name="adj1" fmla="val 50000"/>
+              </a:avLst>
+            </a:prstGeom>
+            <a:ln>
+              <a:tailEnd type="arrow"/>
+            </a:ln>
+          </p:spPr>
+          <p:style>
+            <a:lnRef idx="2">
+              <a:schemeClr val="accent1"/>
+            </a:lnRef>
+            <a:fillRef idx="0">
+              <a:schemeClr val="accent1"/>
+            </a:fillRef>
+            <a:effectRef idx="1">
+              <a:schemeClr val="accent1"/>
+            </a:effectRef>
+            <a:fontRef idx="minor">
+              <a:schemeClr val="tx1"/>
+            </a:fontRef>
+          </p:style>
+        </p:cxnSp>
+        <p:cxnSp>
+          <p:nvCxnSpPr>
+            <p:cNvPr id="13" name="Curved Connector 12"/>
+            <p:cNvCxnSpPr>
+              <a:stCxn id="5" idx="7"/>
+              <a:endCxn id="7" idx="2"/>
+            </p:cNvCxnSpPr>
+            <p:nvPr/>
+          </p:nvCxnSpPr>
+          <p:spPr>
+            <a:xfrm rot="5400000" flipH="1" flipV="1">
+              <a:off x="2180945" y="1345169"/>
+              <a:ext cx="295555" cy="981355"/>
+            </a:xfrm>
+            <a:prstGeom prst="curvedConnector2">
+              <a:avLst/>
+            </a:prstGeom>
+            <a:ln>
+              <a:tailEnd type="arrow"/>
+            </a:ln>
+          </p:spPr>
+          <p:style>
+            <a:lnRef idx="2">
+              <a:schemeClr val="accent1"/>
+            </a:lnRef>
+            <a:fillRef idx="0">
+              <a:schemeClr val="accent1"/>
+            </a:fillRef>
+            <a:effectRef idx="1">
+              <a:schemeClr val="accent1"/>
+            </a:effectRef>
+            <a:fontRef idx="minor">
+              <a:schemeClr val="tx1"/>
+            </a:fontRef>
+          </p:style>
+        </p:cxnSp>
+        <p:cxnSp>
+          <p:nvCxnSpPr>
+            <p:cNvPr id="17" name="Curved Connector 12"/>
+            <p:cNvCxnSpPr>
+              <a:stCxn id="5" idx="5"/>
+              <a:endCxn id="8" idx="2"/>
+            </p:cNvCxnSpPr>
+            <p:nvPr/>
+          </p:nvCxnSpPr>
+          <p:spPr>
+            <a:xfrm rot="16200000" flipH="1">
+              <a:off x="2142845" y="2002112"/>
+              <a:ext cx="371755" cy="981355"/>
+            </a:xfrm>
+            <a:prstGeom prst="curvedConnector2">
+              <a:avLst/>
+            </a:prstGeom>
+            <a:ln>
+              <a:tailEnd type="arrow"/>
+            </a:ln>
+          </p:spPr>
+          <p:style>
+            <a:lnRef idx="2">
+              <a:schemeClr val="accent1"/>
+            </a:lnRef>
+            <a:fillRef idx="0">
+              <a:schemeClr val="accent1"/>
+            </a:fillRef>
+            <a:effectRef idx="1">
+              <a:schemeClr val="accent1"/>
+            </a:effectRef>
+            <a:fontRef idx="minor">
+              <a:schemeClr val="tx1"/>
+            </a:fontRef>
+          </p:style>
+        </p:cxnSp>
+        <p:cxnSp>
+          <p:nvCxnSpPr>
+            <p:cNvPr id="20" name="Curved Connector 12"/>
+            <p:cNvCxnSpPr>
+              <a:stCxn id="8" idx="6"/>
+              <a:endCxn id="9" idx="2"/>
+            </p:cNvCxnSpPr>
+            <p:nvPr/>
+          </p:nvCxnSpPr>
+          <p:spPr>
+            <a:xfrm>
+              <a:off x="3276600" y="2678668"/>
+              <a:ext cx="762000" cy="1588"/>
+            </a:xfrm>
+            <a:prstGeom prst="curvedConnector3">
+              <a:avLst>
+                <a:gd name="adj1" fmla="val 50000"/>
+              </a:avLst>
+            </a:prstGeom>
+            <a:ln>
+              <a:tailEnd type="arrow"/>
+            </a:ln>
+          </p:spPr>
+          <p:style>
+            <a:lnRef idx="2">
+              <a:schemeClr val="accent1"/>
+            </a:lnRef>
+            <a:fillRef idx="0">
+              <a:schemeClr val="accent1"/>
+            </a:fillRef>
+            <a:effectRef idx="1">
+              <a:schemeClr val="accent1"/>
+            </a:effectRef>
+            <a:fontRef idx="minor">
+              <a:schemeClr val="tx1"/>
+            </a:fontRef>
+          </p:style>
+        </p:cxnSp>
+        <p:cxnSp>
+          <p:nvCxnSpPr>
+            <p:cNvPr id="23" name="Curved Connector 12"/>
+            <p:cNvCxnSpPr>
+              <a:stCxn id="9" idx="6"/>
+              <a:endCxn id="10" idx="3"/>
+            </p:cNvCxnSpPr>
+            <p:nvPr/>
+          </p:nvCxnSpPr>
+          <p:spPr>
+            <a:xfrm flipV="1">
+              <a:off x="4495800" y="2306913"/>
+              <a:ext cx="981355" cy="371755"/>
+            </a:xfrm>
+            <a:prstGeom prst="curvedConnector2">
+              <a:avLst/>
+            </a:prstGeom>
+            <a:ln>
+              <a:tailEnd type="arrow"/>
+            </a:ln>
+          </p:spPr>
+          <p:style>
+            <a:lnRef idx="2">
+              <a:schemeClr val="accent1"/>
+            </a:lnRef>
+            <a:fillRef idx="0">
+              <a:schemeClr val="accent1"/>
+            </a:fillRef>
+            <a:effectRef idx="1">
+              <a:schemeClr val="accent1"/>
+            </a:effectRef>
+            <a:fontRef idx="minor">
+              <a:schemeClr val="tx1"/>
+            </a:fontRef>
+          </p:style>
+        </p:cxnSp>
+        <p:cxnSp>
+          <p:nvCxnSpPr>
+            <p:cNvPr id="26" name="Curved Connector 12"/>
+            <p:cNvCxnSpPr>
+              <a:stCxn id="6" idx="6"/>
+              <a:endCxn id="10" idx="1"/>
+            </p:cNvCxnSpPr>
+            <p:nvPr/>
+          </p:nvCxnSpPr>
+          <p:spPr>
+            <a:xfrm>
+              <a:off x="4495800" y="1688068"/>
+              <a:ext cx="981355" cy="295555"/>
+            </a:xfrm>
+            <a:prstGeom prst="curvedConnector2">
+              <a:avLst/>
+            </a:prstGeom>
+            <a:ln>
+              <a:tailEnd type="arrow"/>
+            </a:ln>
+          </p:spPr>
+          <p:style>
+            <a:lnRef idx="2">
+              <a:schemeClr val="accent1"/>
+            </a:lnRef>
+            <a:fillRef idx="0">
+              <a:schemeClr val="accent1"/>
+            </a:fillRef>
+            <a:effectRef idx="1">
+              <a:schemeClr val="accent1"/>
+            </a:effectRef>
+            <a:fontRef idx="minor">
+              <a:schemeClr val="tx1"/>
+            </a:fontRef>
+          </p:style>
+        </p:cxnSp>
+        <p:cxnSp>
+          <p:nvCxnSpPr>
+            <p:cNvPr id="30" name="Curved Connector 12"/>
+            <p:cNvCxnSpPr>
+              <a:stCxn id="8" idx="7"/>
+              <a:endCxn id="6" idx="3"/>
+            </p:cNvCxnSpPr>
+            <p:nvPr/>
+          </p:nvCxnSpPr>
+          <p:spPr>
+            <a:xfrm rot="5400000" flipH="1" flipV="1">
+              <a:off x="3323945" y="1735413"/>
+              <a:ext cx="667310" cy="895910"/>
+            </a:xfrm>
+            <a:prstGeom prst="curvedConnector3">
+              <a:avLst>
+                <a:gd name="adj1" fmla="val 50000"/>
+              </a:avLst>
+            </a:prstGeom>
+            <a:ln>
+              <a:tailEnd type="arrow"/>
+            </a:ln>
+          </p:spPr>
+          <p:style>
+            <a:lnRef idx="2">
+              <a:schemeClr val="accent1"/>
+            </a:lnRef>
+            <a:fillRef idx="0">
+              <a:schemeClr val="accent1"/>
+            </a:fillRef>
+            <a:effectRef idx="1">
+              <a:schemeClr val="accent1"/>
+            </a:effectRef>
+            <a:fontRef idx="minor">
+              <a:schemeClr val="tx1"/>
+            </a:fontRef>
+          </p:style>
+        </p:cxnSp>
+        <p:sp>
+          <p:nvSpPr>
+            <p:cNvPr id="33" name="TextBox 32"/>
+            <p:cNvSpPr txBox="1"/>
+            <p:nvPr/>
+          </p:nvSpPr>
+          <p:spPr>
+            <a:xfrm>
+              <a:off x="1838045" y="1383268"/>
+              <a:ext cx="330276" cy="261610"/>
+            </a:xfrm>
+            <a:prstGeom prst="rect">
+              <a:avLst/>
+            </a:prstGeom>
+            <a:noFill/>
+          </p:spPr>
+          <p:txBody>
+            <a:bodyPr wrap="none" rtlCol="0">
+              <a:spAutoFit/>
+            </a:bodyPr>
+            <a:lstStyle/>
+            <a:p>
+              <a:r>
+                <a:rPr lang="en-US" sz="1100" dirty="0" smtClean="0"/>
+                <a:t>p1</a:t>
+              </a:r>
+              <a:endParaRPr lang="en-US" sz="1100" dirty="0"/>
+            </a:p>
+          </p:txBody>
+        </p:sp>
+        <p:sp>
+          <p:nvSpPr>
+            <p:cNvPr id="34" name="TextBox 33"/>
+            <p:cNvSpPr txBox="1"/>
+            <p:nvPr/>
+          </p:nvSpPr>
+          <p:spPr>
+            <a:xfrm>
+              <a:off x="3429000" y="1328663"/>
+              <a:ext cx="397847" cy="261610"/>
+            </a:xfrm>
+            <a:prstGeom prst="rect">
+              <a:avLst/>
+            </a:prstGeom>
+            <a:noFill/>
+          </p:spPr>
+          <p:txBody>
+            <a:bodyPr wrap="none" rtlCol="0">
+              <a:spAutoFit/>
+            </a:bodyPr>
+            <a:lstStyle/>
+            <a:p>
+              <a:r>
+                <a:rPr lang="en-US" sz="1100" dirty="0" smtClean="0"/>
+                <a:t>e23</a:t>
+              </a:r>
+              <a:endParaRPr lang="en-US" sz="1100" dirty="0"/>
+            </a:p>
+          </p:txBody>
+        </p:sp>
+        <p:sp>
+          <p:nvSpPr>
+            <p:cNvPr id="35" name="TextBox 34"/>
+            <p:cNvSpPr txBox="1"/>
+            <p:nvPr/>
+          </p:nvSpPr>
+          <p:spPr>
+            <a:xfrm>
+              <a:off x="4876693" y="1383268"/>
+              <a:ext cx="397847" cy="261610"/>
+            </a:xfrm>
+            <a:prstGeom prst="rect">
+              <a:avLst/>
+            </a:prstGeom>
+            <a:noFill/>
+          </p:spPr>
+          <p:txBody>
+            <a:bodyPr wrap="none" rtlCol="0">
+              <a:spAutoFit/>
+            </a:bodyPr>
+            <a:lstStyle/>
+            <a:p>
+              <a:r>
+                <a:rPr lang="en-US" sz="1100" dirty="0" smtClean="0"/>
+                <a:t>e36</a:t>
+              </a:r>
+              <a:endParaRPr lang="en-US" sz="1100" dirty="0"/>
+            </a:p>
+          </p:txBody>
+        </p:sp>
+        <p:sp>
+          <p:nvSpPr>
+            <p:cNvPr id="36" name="TextBox 35"/>
+            <p:cNvSpPr txBox="1"/>
+            <p:nvPr/>
+          </p:nvSpPr>
+          <p:spPr>
+            <a:xfrm>
+              <a:off x="2057293" y="2233136"/>
+              <a:ext cx="330276" cy="261610"/>
+            </a:xfrm>
+            <a:prstGeom prst="rect">
+              <a:avLst/>
+            </a:prstGeom>
+            <a:noFill/>
+          </p:spPr>
+          <p:txBody>
+            <a:bodyPr wrap="none" rtlCol="0">
+              <a:spAutoFit/>
+            </a:bodyPr>
+            <a:lstStyle/>
+            <a:p>
+              <a:r>
+                <a:rPr lang="en-US" sz="1100" dirty="0" smtClean="0"/>
+                <a:t>p2</a:t>
+              </a:r>
+              <a:endParaRPr lang="en-US" sz="1100" dirty="0"/>
+            </a:p>
+          </p:txBody>
+        </p:sp>
+        <p:sp>
+          <p:nvSpPr>
+            <p:cNvPr id="37" name="TextBox 36"/>
+            <p:cNvSpPr txBox="1"/>
+            <p:nvPr/>
+          </p:nvSpPr>
+          <p:spPr>
+            <a:xfrm>
+              <a:off x="3429000" y="2363941"/>
+              <a:ext cx="397847" cy="261610"/>
+            </a:xfrm>
+            <a:prstGeom prst="rect">
+              <a:avLst/>
+            </a:prstGeom>
+            <a:noFill/>
+          </p:spPr>
+          <p:txBody>
+            <a:bodyPr wrap="none" rtlCol="0">
+              <a:spAutoFit/>
+            </a:bodyPr>
+            <a:lstStyle/>
+            <a:p>
+              <a:r>
+                <a:rPr lang="en-US" sz="1100" dirty="0" smtClean="0"/>
+                <a:t>e45</a:t>
+              </a:r>
+              <a:endParaRPr lang="en-US" sz="1100" dirty="0"/>
+            </a:p>
+          </p:txBody>
+        </p:sp>
+        <p:sp>
+          <p:nvSpPr>
+            <p:cNvPr id="38" name="TextBox 37"/>
+            <p:cNvSpPr txBox="1"/>
+            <p:nvPr/>
+          </p:nvSpPr>
+          <p:spPr>
+            <a:xfrm>
+              <a:off x="4648093" y="2233136"/>
+              <a:ext cx="397847" cy="261610"/>
+            </a:xfrm>
+            <a:prstGeom prst="rect">
+              <a:avLst/>
+            </a:prstGeom>
+            <a:noFill/>
+          </p:spPr>
+          <p:txBody>
+            <a:bodyPr wrap="none" rtlCol="0">
+              <a:spAutoFit/>
+            </a:bodyPr>
+            <a:lstStyle/>
+            <a:p>
+              <a:r>
+                <a:rPr lang="en-US" sz="1100" dirty="0" smtClean="0"/>
+                <a:t>e56</a:t>
+              </a:r>
+              <a:endParaRPr lang="en-US" sz="1100" dirty="0"/>
+            </a:p>
+          </p:txBody>
+        </p:sp>
+        <p:sp>
+          <p:nvSpPr>
+            <p:cNvPr id="39" name="TextBox 38"/>
+            <p:cNvSpPr txBox="1"/>
+            <p:nvPr/>
+          </p:nvSpPr>
+          <p:spPr>
+            <a:xfrm>
+              <a:off x="3429000" y="1916668"/>
+              <a:ext cx="397847" cy="261610"/>
+            </a:xfrm>
+            <a:prstGeom prst="rect">
+              <a:avLst/>
+            </a:prstGeom>
+            <a:noFill/>
+          </p:spPr>
+          <p:txBody>
+            <a:bodyPr wrap="none" rtlCol="0">
+              <a:spAutoFit/>
+            </a:bodyPr>
+            <a:lstStyle/>
+            <a:p>
+              <a:r>
+                <a:rPr lang="en-US" sz="1100" dirty="0" smtClean="0"/>
+                <a:t>e43</a:t>
+              </a:r>
+              <a:endParaRPr lang="en-US" sz="1100" dirty="0"/>
+            </a:p>
+          </p:txBody>
+        </p:sp>
+      </p:grpSp>
+      <p:sp>
+        <p:nvSpPr>
+          <p:cNvPr id="40" name="TextBox 39"/>
+          <p:cNvSpPr txBox="1"/>
+          <p:nvPr/>
+        </p:nvSpPr>
+        <p:spPr>
+          <a:xfrm>
+            <a:off x="1524000" y="3364468"/>
+            <a:ext cx="287258" cy="369332"/>
+          </a:xfrm>
+          <a:prstGeom prst="rect">
+            <a:avLst/>
+          </a:prstGeom>
+          <a:noFill/>
+        </p:spPr>
+        <p:txBody>
+          <a:bodyPr wrap="none" rtlCol="0">
+            <a:spAutoFit/>
+          </a:bodyPr>
+          <a:lstStyle/>
+          <a:p>
+            <a:r>
+              <a:rPr lang="en-US" dirty="0" err="1" smtClean="0"/>
+              <a:t>x</a:t>
+            </a:r>
+            <a:endParaRPr lang="en-US" dirty="0"/>
+          </a:p>
+        </p:txBody>
+      </p:sp>
+      <p:sp>
+        <p:nvSpPr>
+          <p:cNvPr id="41" name="TextBox 40"/>
+          <p:cNvSpPr txBox="1"/>
+          <p:nvPr/>
+        </p:nvSpPr>
+        <p:spPr>
+          <a:xfrm>
+            <a:off x="2819400" y="3364468"/>
+            <a:ext cx="406143" cy="369332"/>
+          </a:xfrm>
+          <a:prstGeom prst="rect">
+            <a:avLst/>
+          </a:prstGeom>
+          <a:noFill/>
+        </p:spPr>
+        <p:txBody>
+          <a:bodyPr wrap="none" rtlCol="0">
+            <a:spAutoFit/>
+          </a:bodyPr>
+          <a:lstStyle/>
+          <a:p>
+            <a:r>
+              <a:rPr lang="en-US" dirty="0" smtClean="0"/>
+              <a:t>y1</a:t>
+            </a:r>
+            <a:endParaRPr lang="en-US" dirty="0"/>
+          </a:p>
+        </p:txBody>
+      </p:sp>
+      <p:sp>
+        <p:nvSpPr>
+          <p:cNvPr id="42" name="TextBox 41"/>
+          <p:cNvSpPr txBox="1"/>
+          <p:nvPr/>
+        </p:nvSpPr>
+        <p:spPr>
+          <a:xfrm>
+            <a:off x="4038600" y="3364468"/>
+            <a:ext cx="406143" cy="369332"/>
+          </a:xfrm>
+          <a:prstGeom prst="rect">
+            <a:avLst/>
+          </a:prstGeom>
+          <a:noFill/>
+        </p:spPr>
+        <p:txBody>
+          <a:bodyPr wrap="none" rtlCol="0">
+            <a:spAutoFit/>
+          </a:bodyPr>
+          <a:lstStyle/>
+          <a:p>
+            <a:r>
+              <a:rPr lang="en-US" dirty="0" smtClean="0"/>
+              <a:t>y2</a:t>
+            </a:r>
+            <a:endParaRPr lang="en-US" dirty="0"/>
+          </a:p>
+        </p:txBody>
+      </p:sp>
+      <p:sp>
+        <p:nvSpPr>
+          <p:cNvPr id="43" name="TextBox 42"/>
+          <p:cNvSpPr txBox="1"/>
+          <p:nvPr/>
+        </p:nvSpPr>
+        <p:spPr>
+          <a:xfrm>
+            <a:off x="5461257" y="3364468"/>
+            <a:ext cx="275849" cy="369332"/>
+          </a:xfrm>
+          <a:prstGeom prst="rect">
+            <a:avLst/>
+          </a:prstGeom>
+          <a:noFill/>
+        </p:spPr>
+        <p:txBody>
+          <a:bodyPr wrap="none" rtlCol="0">
+            <a:spAutoFit/>
+          </a:bodyPr>
+          <a:lstStyle/>
+          <a:p>
+            <a:r>
+              <a:rPr lang="en-US" dirty="0" err="1" smtClean="0"/>
+              <a:t>z</a:t>
+            </a:r>
+            <a:endParaRPr lang="en-US" dirty="0"/>
+          </a:p>
+        </p:txBody>
+      </p:sp>
+      <p:cxnSp>
+        <p:nvCxnSpPr>
+          <p:cNvPr id="46" name="Elbow Connector 45"/>
+          <p:cNvCxnSpPr>
+            <a:stCxn id="40" idx="3"/>
+            <a:endCxn id="41" idx="1"/>
+          </p:cNvCxnSpPr>
+          <p:nvPr/>
+        </p:nvCxnSpPr>
+        <p:spPr>
+          <a:xfrm>
+            <a:off x="1811258" y="3549134"/>
+            <a:ext cx="1008142" cy="1588"/>
+          </a:xfrm>
+          <a:prstGeom prst="bentConnector3">
+            <a:avLst>
+              <a:gd name="adj1" fmla="val 50000"/>
+            </a:avLst>
+          </a:prstGeom>
+          <a:ln>
+            <a:tailEnd type="arrow"/>
+          </a:ln>
+        </p:spPr>
+        <p:style>
+          <a:lnRef idx="2">
+            <a:schemeClr val="accent1"/>
+          </a:lnRef>
+          <a:fillRef idx="0">
+            <a:schemeClr val="accent1"/>
+          </a:fillRef>
+          <a:effectRef idx="1">
+            <a:schemeClr val="accent1"/>
+          </a:effectRef>
+          <a:fontRef idx="minor">
+            <a:schemeClr val="tx1"/>
+          </a:fontRef>
+        </p:style>
+      </p:cxnSp>
+      <p:cxnSp>
+        <p:nvCxnSpPr>
+          <p:cNvPr id="47" name="Elbow Connector 46"/>
+          <p:cNvCxnSpPr>
+            <a:stCxn id="41" idx="3"/>
+            <a:endCxn id="42" idx="1"/>
+          </p:cNvCxnSpPr>
+          <p:nvPr/>
+        </p:nvCxnSpPr>
+        <p:spPr>
+          <a:xfrm>
+            <a:off x="3225543" y="3549134"/>
+            <a:ext cx="813057" cy="1588"/>
+          </a:xfrm>
+          <a:prstGeom prst="bentConnector3">
+            <a:avLst>
+              <a:gd name="adj1" fmla="val 50000"/>
+            </a:avLst>
+          </a:prstGeom>
+          <a:ln>
+            <a:tailEnd type="arrow"/>
+          </a:ln>
+        </p:spPr>
+        <p:style>
+          <a:lnRef idx="2">
+            <a:schemeClr val="accent1"/>
+          </a:lnRef>
+          <a:fillRef idx="0">
+            <a:schemeClr val="accent1"/>
+          </a:fillRef>
+          <a:effectRef idx="1">
+            <a:schemeClr val="accent1"/>
+          </a:effectRef>
+          <a:fontRef idx="minor">
+            <a:schemeClr val="tx1"/>
+          </a:fontRef>
+        </p:style>
+      </p:cxnSp>
+      <p:cxnSp>
+        <p:nvCxnSpPr>
+          <p:cNvPr id="50" name="Elbow Connector 49"/>
+          <p:cNvCxnSpPr>
+            <a:stCxn id="42" idx="3"/>
+            <a:endCxn id="43" idx="1"/>
+          </p:cNvCxnSpPr>
+          <p:nvPr/>
+        </p:nvCxnSpPr>
+        <p:spPr>
+          <a:xfrm>
+            <a:off x="4444743" y="3549134"/>
+            <a:ext cx="1016514" cy="1588"/>
+          </a:xfrm>
+          <a:prstGeom prst="bentConnector3">
+            <a:avLst>
+              <a:gd name="adj1" fmla="val 50000"/>
+            </a:avLst>
+          </a:prstGeom>
+          <a:ln>
+            <a:tailEnd type="arrow"/>
+          </a:ln>
+        </p:spPr>
+        <p:style>
+          <a:lnRef idx="2">
+            <a:schemeClr val="accent1"/>
+          </a:lnRef>
+          <a:fillRef idx="0">
+            <a:schemeClr val="accent1"/>
+          </a:fillRef>
+          <a:effectRef idx="1">
+            <a:schemeClr val="accent1"/>
+          </a:effectRef>
+          <a:fontRef idx="minor">
+            <a:schemeClr val="tx1"/>
+          </a:fontRef>
+        </p:style>
+      </p:cxnSp>
+      <p:sp>
+        <p:nvSpPr>
+          <p:cNvPr id="53" name="TextBox 52"/>
+          <p:cNvSpPr txBox="1"/>
+          <p:nvPr/>
+        </p:nvSpPr>
+        <p:spPr>
+          <a:xfrm>
+            <a:off x="2088274" y="3156466"/>
+            <a:ext cx="305943" cy="369332"/>
+          </a:xfrm>
+          <a:prstGeom prst="rect">
+            <a:avLst/>
+          </a:prstGeom>
+          <a:noFill/>
+        </p:spPr>
+        <p:txBody>
+          <a:bodyPr wrap="none" rtlCol="0">
+            <a:spAutoFit/>
+          </a:bodyPr>
+          <a:lstStyle/>
+          <a:p>
+            <a:r>
+              <a:rPr lang="en-US" dirty="0" err="1" smtClean="0"/>
+              <a:t>p</a:t>
+            </a:r>
+            <a:endParaRPr lang="en-US" dirty="0"/>
+          </a:p>
+        </p:txBody>
+      </p:sp>
+      <p:sp>
+        <p:nvSpPr>
+          <p:cNvPr id="54" name="TextBox 53"/>
+          <p:cNvSpPr txBox="1"/>
+          <p:nvPr/>
+        </p:nvSpPr>
+        <p:spPr>
+          <a:xfrm>
+            <a:off x="3429000" y="3124200"/>
+            <a:ext cx="305943" cy="369332"/>
+          </a:xfrm>
+          <a:prstGeom prst="rect">
+            <a:avLst/>
+          </a:prstGeom>
+          <a:noFill/>
+        </p:spPr>
+        <p:txBody>
+          <a:bodyPr wrap="none" rtlCol="0">
+            <a:spAutoFit/>
+          </a:bodyPr>
+          <a:lstStyle/>
+          <a:p>
+            <a:r>
+              <a:rPr lang="en-US" dirty="0" err="1" smtClean="0"/>
+              <a:t>q</a:t>
+            </a:r>
+            <a:endParaRPr lang="en-US" dirty="0"/>
+          </a:p>
+        </p:txBody>
+      </p:sp>
+      <p:sp>
+        <p:nvSpPr>
+          <p:cNvPr id="55" name="TextBox 54"/>
+          <p:cNvSpPr txBox="1"/>
+          <p:nvPr/>
+        </p:nvSpPr>
+        <p:spPr>
+          <a:xfrm>
+            <a:off x="4780798" y="3156466"/>
+            <a:ext cx="265142" cy="369332"/>
+          </a:xfrm>
+          <a:prstGeom prst="rect">
+            <a:avLst/>
+          </a:prstGeom>
+          <a:noFill/>
+        </p:spPr>
+        <p:txBody>
+          <a:bodyPr wrap="none" rtlCol="0">
+            <a:spAutoFit/>
+          </a:bodyPr>
+          <a:lstStyle/>
+          <a:p>
+            <a:r>
+              <a:rPr lang="en-US" dirty="0" err="1" smtClean="0"/>
+              <a:t>r</a:t>
+            </a:r>
+            <a:endParaRPr lang="en-US" dirty="0"/>
+          </a:p>
+        </p:txBody>
+      </p:sp>
+      <p:sp>
+        <p:nvSpPr>
+          <p:cNvPr id="56" name="TextBox 55"/>
+          <p:cNvSpPr txBox="1"/>
+          <p:nvPr/>
+        </p:nvSpPr>
+        <p:spPr>
+          <a:xfrm>
+            <a:off x="6629400" y="3364468"/>
+            <a:ext cx="805366" cy="369332"/>
+          </a:xfrm>
+          <a:prstGeom prst="rect">
+            <a:avLst/>
+          </a:prstGeom>
+          <a:noFill/>
+        </p:spPr>
+        <p:txBody>
+          <a:bodyPr wrap="none" rtlCol="0">
+            <a:spAutoFit/>
+          </a:bodyPr>
+          <a:lstStyle/>
+          <a:p>
+            <a:r>
+              <a:rPr lang="en-US" dirty="0" smtClean="0"/>
+              <a:t>MOTIF</a:t>
+            </a:r>
+            <a:endParaRPr lang="en-US" dirty="0"/>
+          </a:p>
+        </p:txBody>
+      </p:sp>
+      <p:sp>
+        <p:nvSpPr>
+          <p:cNvPr id="57" name="TextBox 56"/>
+          <p:cNvSpPr txBox="1"/>
+          <p:nvPr/>
+        </p:nvSpPr>
+        <p:spPr>
+          <a:xfrm>
+            <a:off x="6629400" y="1732002"/>
+            <a:ext cx="852254" cy="369332"/>
+          </a:xfrm>
+          <a:prstGeom prst="rect">
+            <a:avLst/>
+          </a:prstGeom>
+          <a:noFill/>
+        </p:spPr>
+        <p:txBody>
+          <a:bodyPr wrap="none" rtlCol="0">
+            <a:spAutoFit/>
+          </a:bodyPr>
+          <a:lstStyle/>
+          <a:p>
+            <a:r>
+              <a:rPr lang="en-US" dirty="0" smtClean="0"/>
+              <a:t>GRAPH</a:t>
+            </a:r>
+            <a:endParaRPr lang="en-US" dirty="0"/>
           </a:p>
         </p:txBody>
       </p:sp>

</xml_diff>